<commit_message>
FINISHED + PPTX UPDATED
</commit_message>
<xml_diff>
--- a/Projeto final.pptx
+++ b/Projeto final.pptx
@@ -288,7 +288,7 @@
           <a:p>
             <a:fld id="{DBEE12C2-4398-4F5C-9092-A9D99A997E55}" type="datetimeFigureOut">
               <a:rPr lang="pt-BR" smtClean="0"/>
-              <a:t>12/12/2022</a:t>
+              <a:t>13/12/2022</a:t>
             </a:fld>
             <a:endParaRPr lang="pt-BR"/>
           </a:p>
@@ -555,7 +555,7 @@
           <a:p>
             <a:fld id="{DBEE12C2-4398-4F5C-9092-A9D99A997E55}" type="datetimeFigureOut">
               <a:rPr lang="pt-BR" smtClean="0"/>
-              <a:t>12/12/2022</a:t>
+              <a:t>13/12/2022</a:t>
             </a:fld>
             <a:endParaRPr lang="pt-BR"/>
           </a:p>
@@ -786,7 +786,7 @@
           <a:p>
             <a:fld id="{DBEE12C2-4398-4F5C-9092-A9D99A997E55}" type="datetimeFigureOut">
               <a:rPr lang="pt-BR" smtClean="0"/>
-              <a:t>12/12/2022</a:t>
+              <a:t>13/12/2022</a:t>
             </a:fld>
             <a:endParaRPr lang="pt-BR"/>
           </a:p>
@@ -1096,7 +1096,7 @@
           <a:p>
             <a:fld id="{DBEE12C2-4398-4F5C-9092-A9D99A997E55}" type="datetimeFigureOut">
               <a:rPr lang="pt-BR" smtClean="0"/>
-              <a:t>12/12/2022</a:t>
+              <a:t>13/12/2022</a:t>
             </a:fld>
             <a:endParaRPr lang="pt-BR"/>
           </a:p>
@@ -1569,7 +1569,7 @@
           <a:p>
             <a:fld id="{DBEE12C2-4398-4F5C-9092-A9D99A997E55}" type="datetimeFigureOut">
               <a:rPr lang="pt-BR" smtClean="0"/>
-              <a:t>12/12/2022</a:t>
+              <a:t>13/12/2022</a:t>
             </a:fld>
             <a:endParaRPr lang="pt-BR"/>
           </a:p>
@@ -2116,7 +2116,7 @@
           <a:p>
             <a:fld id="{DBEE12C2-4398-4F5C-9092-A9D99A997E55}" type="datetimeFigureOut">
               <a:rPr lang="pt-BR" smtClean="0"/>
-              <a:t>12/12/2022</a:t>
+              <a:t>13/12/2022</a:t>
             </a:fld>
             <a:endParaRPr lang="pt-BR"/>
           </a:p>
@@ -2890,7 +2890,7 @@
           <a:p>
             <a:fld id="{DBEE12C2-4398-4F5C-9092-A9D99A997E55}" type="datetimeFigureOut">
               <a:rPr lang="pt-BR" smtClean="0"/>
-              <a:t>12/12/2022</a:t>
+              <a:t>13/12/2022</a:t>
             </a:fld>
             <a:endParaRPr lang="pt-BR"/>
           </a:p>
@@ -3065,7 +3065,7 @@
           <a:p>
             <a:fld id="{DBEE12C2-4398-4F5C-9092-A9D99A997E55}" type="datetimeFigureOut">
               <a:rPr lang="pt-BR" smtClean="0"/>
-              <a:t>12/12/2022</a:t>
+              <a:t>13/12/2022</a:t>
             </a:fld>
             <a:endParaRPr lang="pt-BR"/>
           </a:p>
@@ -3288,7 +3288,7 @@
           <a:p>
             <a:fld id="{DBEE12C2-4398-4F5C-9092-A9D99A997E55}" type="datetimeFigureOut">
               <a:rPr lang="pt-BR" smtClean="0"/>
-              <a:t>12/12/2022</a:t>
+              <a:t>13/12/2022</a:t>
             </a:fld>
             <a:endParaRPr lang="pt-BR"/>
           </a:p>
@@ -3468,7 +3468,7 @@
           <a:p>
             <a:fld id="{DBEE12C2-4398-4F5C-9092-A9D99A997E55}" type="datetimeFigureOut">
               <a:rPr lang="pt-BR" smtClean="0"/>
-              <a:t>12/12/2022</a:t>
+              <a:t>13/12/2022</a:t>
             </a:fld>
             <a:endParaRPr lang="pt-BR"/>
           </a:p>
@@ -3757,7 +3757,7 @@
           <a:p>
             <a:fld id="{DBEE12C2-4398-4F5C-9092-A9D99A997E55}" type="datetimeFigureOut">
               <a:rPr lang="pt-BR" smtClean="0"/>
-              <a:t>12/12/2022</a:t>
+              <a:t>13/12/2022</a:t>
             </a:fld>
             <a:endParaRPr lang="pt-BR"/>
           </a:p>
@@ -3999,7 +3999,7 @@
           <a:p>
             <a:fld id="{DBEE12C2-4398-4F5C-9092-A9D99A997E55}" type="datetimeFigureOut">
               <a:rPr lang="pt-BR" smtClean="0"/>
-              <a:t>12/12/2022</a:t>
+              <a:t>13/12/2022</a:t>
             </a:fld>
             <a:endParaRPr lang="pt-BR"/>
           </a:p>
@@ -4378,7 +4378,7 @@
           <a:p>
             <a:fld id="{DBEE12C2-4398-4F5C-9092-A9D99A997E55}" type="datetimeFigureOut">
               <a:rPr lang="pt-BR" smtClean="0"/>
-              <a:t>12/12/2022</a:t>
+              <a:t>13/12/2022</a:t>
             </a:fld>
             <a:endParaRPr lang="pt-BR"/>
           </a:p>
@@ -4496,7 +4496,7 @@
           <a:p>
             <a:fld id="{DBEE12C2-4398-4F5C-9092-A9D99A997E55}" type="datetimeFigureOut">
               <a:rPr lang="pt-BR" smtClean="0"/>
-              <a:t>12/12/2022</a:t>
+              <a:t>13/12/2022</a:t>
             </a:fld>
             <a:endParaRPr lang="pt-BR"/>
           </a:p>
@@ -4591,7 +4591,7 @@
           <a:p>
             <a:fld id="{DBEE12C2-4398-4F5C-9092-A9D99A997E55}" type="datetimeFigureOut">
               <a:rPr lang="pt-BR" smtClean="0"/>
-              <a:t>12/12/2022</a:t>
+              <a:t>13/12/2022</a:t>
             </a:fld>
             <a:endParaRPr lang="pt-BR"/>
           </a:p>
@@ -4840,7 +4840,7 @@
           <a:p>
             <a:fld id="{DBEE12C2-4398-4F5C-9092-A9D99A997E55}" type="datetimeFigureOut">
               <a:rPr lang="pt-BR" smtClean="0"/>
-              <a:t>12/12/2022</a:t>
+              <a:t>13/12/2022</a:t>
             </a:fld>
             <a:endParaRPr lang="pt-BR"/>
           </a:p>
@@ -5097,7 +5097,7 @@
           <a:p>
             <a:fld id="{DBEE12C2-4398-4F5C-9092-A9D99A997E55}" type="datetimeFigureOut">
               <a:rPr lang="pt-BR" smtClean="0"/>
-              <a:t>12/12/2022</a:t>
+              <a:t>13/12/2022</a:t>
             </a:fld>
             <a:endParaRPr lang="pt-BR"/>
           </a:p>
@@ -5340,7 +5340,7 @@
           <a:p>
             <a:fld id="{DBEE12C2-4398-4F5C-9092-A9D99A997E55}" type="datetimeFigureOut">
               <a:rPr lang="pt-BR" smtClean="0"/>
-              <a:t>12/12/2022</a:t>
+              <a:t>13/12/2022</a:t>
             </a:fld>
             <a:endParaRPr lang="pt-BR"/>
           </a:p>
@@ -6047,8 +6047,8 @@
         </p:blipFill>
         <p:spPr>
           <a:xfrm>
-            <a:off x="229771" y="1343510"/>
-            <a:ext cx="11732457" cy="5296442"/>
+            <a:off x="229770" y="1343510"/>
+            <a:ext cx="11959200" cy="5398802"/>
           </a:xfrm>
           <a:prstGeom prst="rect">
             <a:avLst/>
@@ -6143,7 +6143,7 @@
         <p:spPr>
           <a:xfrm>
             <a:off x="196948" y="1336431"/>
-            <a:ext cx="11802794" cy="5205810"/>
+            <a:ext cx="11959200" cy="5274796"/>
           </a:xfrm>
         </p:spPr>
       </p:pic>
@@ -6257,8 +6257,8 @@
         </p:blipFill>
         <p:spPr>
           <a:xfrm>
-            <a:off x="126609" y="1121421"/>
-            <a:ext cx="11662118" cy="5612763"/>
+            <a:off x="126608" y="1121420"/>
+            <a:ext cx="11959200" cy="5612765"/>
           </a:xfrm>
           <a:prstGeom prst="rect">
             <a:avLst/>
@@ -6355,10 +6355,10 @@
       </p:sp>
       <p:pic>
         <p:nvPicPr>
-          <p:cNvPr id="7" name="Imagem 6">
+          <p:cNvPr id="5" name="Imagem 4">
             <a:extLst>
               <a:ext uri="{FF2B5EF4-FFF2-40B4-BE49-F238E27FC236}">
-                <a16:creationId xmlns:a16="http://schemas.microsoft.com/office/drawing/2014/main" id="{06BF441C-9271-1D86-94EE-791F56D5A201}"/>
+                <a16:creationId xmlns:a16="http://schemas.microsoft.com/office/drawing/2014/main" id="{CF16BFAB-468B-BA8E-02BE-79E412CE5AC8}"/>
               </a:ext>
             </a:extLst>
           </p:cNvPr>
@@ -6375,8 +6375,8 @@
         </p:blipFill>
         <p:spPr>
           <a:xfrm>
-            <a:off x="246743" y="1277944"/>
-            <a:ext cx="11698514" cy="5398122"/>
+            <a:off x="98474" y="1296394"/>
+            <a:ext cx="11957538" cy="5446438"/>
           </a:xfrm>
           <a:prstGeom prst="rect">
             <a:avLst/>

</xml_diff>